<commit_message>
updated ppt, added fixed images
</commit_message>
<xml_diff>
--- a/SOLID_Plakat.pptx
+++ b/SOLID_Plakat.pptx
@@ -123,6 +123,235 @@
 </p:presentation>
 </file>
 
+<file path=ppt/revisionInfo.xml><?xml version="1.0" encoding="utf-8"?>
+<p1510:revInfo xmlns:a="http://schemas.openxmlformats.org/drawingml/2006/main" xmlns:r="http://schemas.openxmlformats.org/officeDocument/2006/relationships" xmlns:p1510="http://schemas.microsoft.com/office/powerpoint/2015/10/main">
+  <p1510:revLst>
+    <p1510:client id="{71EAE08D-7B05-45DE-A3EC-D27C2F0B56E5}" v="39" dt="2019-07-23T06:56:49.518"/>
+  </p1510:revLst>
+</p1510:revInfo>
+</file>
+
+<file path=ppt/changesInfos/changesInfo1.xml><?xml version="1.0" encoding="utf-8"?>
+<pc:chgInfo xmlns:a="http://schemas.openxmlformats.org/drawingml/2006/main" xmlns:r="http://schemas.openxmlformats.org/officeDocument/2006/relationships" xmlns:ac="http://schemas.microsoft.com/office/drawing/2013/main/command" xmlns:pc="http://schemas.microsoft.com/office/powerpoint/2013/main/command">
+  <pc:docChgLst>
+    <pc:chgData name="Daniel Bätz" userId="77dcb93b8391560a" providerId="LiveId" clId="{71EAE08D-7B05-45DE-A3EC-D27C2F0B56E5}"/>
+    <pc:docChg chg="undo custSel modSld">
+      <pc:chgData name="Daniel Bätz" userId="77dcb93b8391560a" providerId="LiveId" clId="{71EAE08D-7B05-45DE-A3EC-D27C2F0B56E5}" dt="2019-07-23T06:42:07.478" v="203" actId="478"/>
+      <pc:docMkLst>
+        <pc:docMk/>
+      </pc:docMkLst>
+      <pc:sldChg chg="addSp delSp modSp">
+        <pc:chgData name="Daniel Bätz" userId="77dcb93b8391560a" providerId="LiveId" clId="{71EAE08D-7B05-45DE-A3EC-D27C2F0B56E5}" dt="2019-07-23T06:42:07.478" v="203" actId="478"/>
+        <pc:sldMkLst>
+          <pc:docMk/>
+          <pc:sldMk cId="2582458116" sldId="256"/>
+        </pc:sldMkLst>
+        <pc:spChg chg="mod">
+          <ac:chgData name="Daniel Bätz" userId="77dcb93b8391560a" providerId="LiveId" clId="{71EAE08D-7B05-45DE-A3EC-D27C2F0B56E5}" dt="2019-07-23T06:33:48.934" v="16" actId="1076"/>
+          <ac:spMkLst>
+            <pc:docMk/>
+            <pc:sldMk cId="2582458116" sldId="256"/>
+            <ac:spMk id="10" creationId="{00000000-0000-0000-0000-000000000000}"/>
+          </ac:spMkLst>
+        </pc:spChg>
+        <pc:spChg chg="del">
+          <ac:chgData name="Daniel Bätz" userId="77dcb93b8391560a" providerId="LiveId" clId="{71EAE08D-7B05-45DE-A3EC-D27C2F0B56E5}" dt="2019-07-23T06:33:04.829" v="11" actId="478"/>
+          <ac:spMkLst>
+            <pc:docMk/>
+            <pc:sldMk cId="2582458116" sldId="256"/>
+            <ac:spMk id="11" creationId="{00000000-0000-0000-0000-000000000000}"/>
+          </ac:spMkLst>
+        </pc:spChg>
+        <pc:spChg chg="mod">
+          <ac:chgData name="Daniel Bätz" userId="77dcb93b8391560a" providerId="LiveId" clId="{71EAE08D-7B05-45DE-A3EC-D27C2F0B56E5}" dt="2019-07-23T06:34:15.779" v="54" actId="1038"/>
+          <ac:spMkLst>
+            <pc:docMk/>
+            <pc:sldMk cId="2582458116" sldId="256"/>
+            <ac:spMk id="36" creationId="{00000000-0000-0000-0000-000000000000}"/>
+          </ac:spMkLst>
+        </pc:spChg>
+        <pc:spChg chg="mod">
+          <ac:chgData name="Daniel Bätz" userId="77dcb93b8391560a" providerId="LiveId" clId="{71EAE08D-7B05-45DE-A3EC-D27C2F0B56E5}" dt="2019-07-23T06:34:22.366" v="70" actId="1035"/>
+          <ac:spMkLst>
+            <pc:docMk/>
+            <pc:sldMk cId="2582458116" sldId="256"/>
+            <ac:spMk id="37" creationId="{00000000-0000-0000-0000-000000000000}"/>
+          </ac:spMkLst>
+        </pc:spChg>
+        <pc:spChg chg="del">
+          <ac:chgData name="Daniel Bätz" userId="77dcb93b8391560a" providerId="LiveId" clId="{71EAE08D-7B05-45DE-A3EC-D27C2F0B56E5}" dt="2019-07-23T06:34:28.323" v="71" actId="478"/>
+          <ac:spMkLst>
+            <pc:docMk/>
+            <pc:sldMk cId="2582458116" sldId="256"/>
+            <ac:spMk id="38" creationId="{00000000-0000-0000-0000-000000000000}"/>
+          </ac:spMkLst>
+        </pc:spChg>
+        <pc:spChg chg="mod">
+          <ac:chgData name="Daniel Bätz" userId="77dcb93b8391560a" providerId="LiveId" clId="{71EAE08D-7B05-45DE-A3EC-D27C2F0B56E5}" dt="2019-07-23T06:35:01.956" v="168" actId="14100"/>
+          <ac:spMkLst>
+            <pc:docMk/>
+            <pc:sldMk cId="2582458116" sldId="256"/>
+            <ac:spMk id="39" creationId="{00000000-0000-0000-0000-000000000000}"/>
+          </ac:spMkLst>
+        </pc:spChg>
+        <pc:spChg chg="mod">
+          <ac:chgData name="Daniel Bätz" userId="77dcb93b8391560a" providerId="LiveId" clId="{71EAE08D-7B05-45DE-A3EC-D27C2F0B56E5}" dt="2019-07-23T06:34:04.896" v="33" actId="1035"/>
+          <ac:spMkLst>
+            <pc:docMk/>
+            <pc:sldMk cId="2582458116" sldId="256"/>
+            <ac:spMk id="40" creationId="{00000000-0000-0000-0000-000000000000}"/>
+          </ac:spMkLst>
+        </pc:spChg>
+        <pc:spChg chg="del">
+          <ac:chgData name="Daniel Bätz" userId="77dcb93b8391560a" providerId="LiveId" clId="{71EAE08D-7B05-45DE-A3EC-D27C2F0B56E5}" dt="2019-07-23T06:42:04.937" v="202" actId="478"/>
+          <ac:spMkLst>
+            <pc:docMk/>
+            <pc:sldMk cId="2582458116" sldId="256"/>
+            <ac:spMk id="43" creationId="{00000000-0000-0000-0000-000000000000}"/>
+          </ac:spMkLst>
+        </pc:spChg>
+        <pc:spChg chg="del">
+          <ac:chgData name="Daniel Bätz" userId="77dcb93b8391560a" providerId="LiveId" clId="{71EAE08D-7B05-45DE-A3EC-D27C2F0B56E5}" dt="2019-07-23T06:41:52.126" v="200" actId="478"/>
+          <ac:spMkLst>
+            <pc:docMk/>
+            <pc:sldMk cId="2582458116" sldId="256"/>
+            <ac:spMk id="44" creationId="{00000000-0000-0000-0000-000000000000}"/>
+          </ac:spMkLst>
+        </pc:spChg>
+        <pc:spChg chg="del">
+          <ac:chgData name="Daniel Bätz" userId="77dcb93b8391560a" providerId="LiveId" clId="{71EAE08D-7B05-45DE-A3EC-D27C2F0B56E5}" dt="2019-07-23T06:42:07.478" v="203" actId="478"/>
+          <ac:spMkLst>
+            <pc:docMk/>
+            <pc:sldMk cId="2582458116" sldId="256"/>
+            <ac:spMk id="45" creationId="{00000000-0000-0000-0000-000000000000}"/>
+          </ac:spMkLst>
+        </pc:spChg>
+        <pc:spChg chg="del">
+          <ac:chgData name="Daniel Bätz" userId="77dcb93b8391560a" providerId="LiveId" clId="{71EAE08D-7B05-45DE-A3EC-D27C2F0B56E5}" dt="2019-07-23T06:41:54.585" v="201" actId="478"/>
+          <ac:spMkLst>
+            <pc:docMk/>
+            <pc:sldMk cId="2582458116" sldId="256"/>
+            <ac:spMk id="48" creationId="{00000000-0000-0000-0000-000000000000}"/>
+          </ac:spMkLst>
+        </pc:spChg>
+        <pc:spChg chg="add mod">
+          <ac:chgData name="Daniel Bätz" userId="77dcb93b8391560a" providerId="LiveId" clId="{71EAE08D-7B05-45DE-A3EC-D27C2F0B56E5}" dt="2019-07-23T06:34:41.852" v="144" actId="1035"/>
+          <ac:spMkLst>
+            <pc:docMk/>
+            <pc:sldMk cId="2582458116" sldId="256"/>
+            <ac:spMk id="49" creationId="{71E2FBFE-EFD1-40FA-8E30-2DAFED33905A}"/>
+          </ac:spMkLst>
+        </pc:spChg>
+        <pc:grpChg chg="del mod">
+          <ac:chgData name="Daniel Bätz" userId="77dcb93b8391560a" providerId="LiveId" clId="{71EAE08D-7B05-45DE-A3EC-D27C2F0B56E5}" dt="2019-07-23T06:36:19.024" v="178" actId="478"/>
+          <ac:grpSpMkLst>
+            <pc:docMk/>
+            <pc:sldMk cId="2582458116" sldId="256"/>
+            <ac:grpSpMk id="12" creationId="{0372D3BA-E3B8-47BA-9D7F-38137B1457EE}"/>
+          </ac:grpSpMkLst>
+        </pc:grpChg>
+        <pc:grpChg chg="add del mod">
+          <ac:chgData name="Daniel Bätz" userId="77dcb93b8391560a" providerId="LiveId" clId="{71EAE08D-7B05-45DE-A3EC-D27C2F0B56E5}" dt="2019-07-23T06:36:21.320" v="179" actId="478"/>
+          <ac:grpSpMkLst>
+            <pc:docMk/>
+            <pc:sldMk cId="2582458116" sldId="256"/>
+            <ac:grpSpMk id="29" creationId="{4956FF17-2A82-4D23-96F2-14C8ECE40F71}"/>
+          </ac:grpSpMkLst>
+        </pc:grpChg>
+        <pc:graphicFrameChg chg="add del mod">
+          <ac:chgData name="Daniel Bätz" userId="77dcb93b8391560a" providerId="LiveId" clId="{71EAE08D-7B05-45DE-A3EC-D27C2F0B56E5}" dt="2019-07-23T06:36:35.384" v="183" actId="478"/>
+          <ac:graphicFrameMkLst>
+            <pc:docMk/>
+            <pc:sldMk cId="2582458116" sldId="256"/>
+            <ac:graphicFrameMk id="3" creationId="{4B606994-B817-451F-B82F-94B7B4F4DB0E}"/>
+          </ac:graphicFrameMkLst>
+        </pc:graphicFrameChg>
+        <pc:graphicFrameChg chg="modGraphic">
+          <ac:chgData name="Daniel Bätz" userId="77dcb93b8391560a" providerId="LiveId" clId="{71EAE08D-7B05-45DE-A3EC-D27C2F0B56E5}" dt="2019-07-23T06:41:47.548" v="199" actId="14734"/>
+          <ac:graphicFrameMkLst>
+            <pc:docMk/>
+            <pc:sldMk cId="2582458116" sldId="256"/>
+            <ac:graphicFrameMk id="16" creationId="{00000000-0000-0000-0000-000000000000}"/>
+          </ac:graphicFrameMkLst>
+        </pc:graphicFrameChg>
+        <pc:picChg chg="del">
+          <ac:chgData name="Daniel Bätz" userId="77dcb93b8391560a" providerId="LiveId" clId="{71EAE08D-7B05-45DE-A3EC-D27C2F0B56E5}" dt="2019-07-23T06:41:41.027" v="196" actId="478"/>
+          <ac:picMkLst>
+            <pc:docMk/>
+            <pc:sldMk cId="2582458116" sldId="256"/>
+            <ac:picMk id="2" creationId="{00000000-0000-0000-0000-000000000000}"/>
+          </ac:picMkLst>
+        </pc:picChg>
+        <pc:picChg chg="del mod">
+          <ac:chgData name="Daniel Bätz" userId="77dcb93b8391560a" providerId="LiveId" clId="{71EAE08D-7B05-45DE-A3EC-D27C2F0B56E5}" dt="2019-07-23T06:36:19.024" v="178" actId="478"/>
+          <ac:picMkLst>
+            <pc:docMk/>
+            <pc:sldMk cId="2582458116" sldId="256"/>
+            <ac:picMk id="6" creationId="{43EE47C3-35CC-4BED-83B4-1003A6817F51}"/>
+          </ac:picMkLst>
+        </pc:picChg>
+        <pc:picChg chg="add mod">
+          <ac:chgData name="Daniel Bätz" userId="77dcb93b8391560a" providerId="LiveId" clId="{71EAE08D-7B05-45DE-A3EC-D27C2F0B56E5}" dt="2019-07-23T06:41:19.512" v="192" actId="14100"/>
+          <ac:picMkLst>
+            <pc:docMk/>
+            <pc:sldMk cId="2582458116" sldId="256"/>
+            <ac:picMk id="8" creationId="{2288CC2A-6D3E-42EE-AE1F-2053886C4BBB}"/>
+          </ac:picMkLst>
+        </pc:picChg>
+        <pc:picChg chg="del">
+          <ac:chgData name="Daniel Bätz" userId="77dcb93b8391560a" providerId="LiveId" clId="{71EAE08D-7B05-45DE-A3EC-D27C2F0B56E5}" dt="2019-07-23T06:41:42.765" v="197" actId="478"/>
+          <ac:picMkLst>
+            <pc:docMk/>
+            <pc:sldMk cId="2582458116" sldId="256"/>
+            <ac:picMk id="13" creationId="{00000000-0000-0000-0000-000000000000}"/>
+          </ac:picMkLst>
+        </pc:picChg>
+        <pc:picChg chg="del mod">
+          <ac:chgData name="Daniel Bätz" userId="77dcb93b8391560a" providerId="LiveId" clId="{71EAE08D-7B05-45DE-A3EC-D27C2F0B56E5}" dt="2019-07-23T06:41:30.369" v="194" actId="478"/>
+          <ac:picMkLst>
+            <pc:docMk/>
+            <pc:sldMk cId="2582458116" sldId="256"/>
+            <ac:picMk id="15" creationId="{00000000-0000-0000-0000-000000000000}"/>
+          </ac:picMkLst>
+        </pc:picChg>
+        <pc:picChg chg="del">
+          <ac:chgData name="Daniel Bätz" userId="77dcb93b8391560a" providerId="LiveId" clId="{71EAE08D-7B05-45DE-A3EC-D27C2F0B56E5}" dt="2019-07-23T06:41:44.522" v="198" actId="478"/>
+          <ac:picMkLst>
+            <pc:docMk/>
+            <pc:sldMk cId="2582458116" sldId="256"/>
+            <ac:picMk id="20" creationId="{00000000-0000-0000-0000-000000000000}"/>
+          </ac:picMkLst>
+        </pc:picChg>
+        <pc:picChg chg="add del mod">
+          <ac:chgData name="Daniel Bätz" userId="77dcb93b8391560a" providerId="LiveId" clId="{71EAE08D-7B05-45DE-A3EC-D27C2F0B56E5}" dt="2019-07-23T06:33:54.048" v="18" actId="1076"/>
+          <ac:picMkLst>
+            <pc:docMk/>
+            <pc:sldMk cId="2582458116" sldId="256"/>
+            <ac:picMk id="2075" creationId="{00000000-0000-0000-0000-000000000000}"/>
+          </ac:picMkLst>
+        </pc:picChg>
+        <pc:picChg chg="add del">
+          <ac:chgData name="Daniel Bätz" userId="77dcb93b8391560a" providerId="LiveId" clId="{71EAE08D-7B05-45DE-A3EC-D27C2F0B56E5}" dt="2019-07-23T06:32:26.225" v="6" actId="478"/>
+          <ac:picMkLst>
+            <pc:docMk/>
+            <pc:sldMk cId="2582458116" sldId="256"/>
+            <ac:picMk id="2076" creationId="{00000000-0000-0000-0000-000000000000}"/>
+          </ac:picMkLst>
+        </pc:picChg>
+        <pc:cxnChg chg="del mod">
+          <ac:chgData name="Daniel Bätz" userId="77dcb93b8391560a" providerId="LiveId" clId="{71EAE08D-7B05-45DE-A3EC-D27C2F0B56E5}" dt="2019-07-23T06:41:34.031" v="195" actId="478"/>
+          <ac:cxnSpMkLst>
+            <pc:docMk/>
+            <pc:sldMk cId="2582458116" sldId="256"/>
+            <ac:cxnSpMk id="9" creationId="{00000000-0000-0000-0000-000000000000}"/>
+          </ac:cxnSpMkLst>
+        </pc:cxnChg>
+      </pc:sldChg>
+    </pc:docChg>
+  </pc:docChgLst>
+</pc:chgInfo>
+</file>
+
 <file path=ppt/slideLayouts/slideLayout1.xml><?xml version="1.0" encoding="utf-8"?>
 <p:sldLayout xmlns:a="http://schemas.openxmlformats.org/drawingml/2006/main" xmlns:r="http://schemas.openxmlformats.org/officeDocument/2006/relationships" xmlns:p="http://schemas.openxmlformats.org/presentationml/2006/main" type="title" preserve="1">
   <p:cSld name="Titelfolie">
@@ -302,7 +531,7 @@
           <a:p>
             <a:fld id="{C3DB19C7-2C0D-4B6D-9AA5-D2D83B8D3278}" type="datetimeFigureOut">
               <a:rPr lang="de-DE" smtClean="0"/>
-              <a:t>20.07.2019</a:t>
+              <a:t>23. Jul. 2019</a:t>
             </a:fld>
             <a:endParaRPr lang="de-DE"/>
           </a:p>
@@ -470,7 +699,7 @@
           <a:p>
             <a:fld id="{C3DB19C7-2C0D-4B6D-9AA5-D2D83B8D3278}" type="datetimeFigureOut">
               <a:rPr lang="de-DE" smtClean="0"/>
-              <a:t>20.07.2019</a:t>
+              <a:t>23. Jul. 2019</a:t>
             </a:fld>
             <a:endParaRPr lang="de-DE"/>
           </a:p>
@@ -648,7 +877,7 @@
           <a:p>
             <a:fld id="{C3DB19C7-2C0D-4B6D-9AA5-D2D83B8D3278}" type="datetimeFigureOut">
               <a:rPr lang="de-DE" smtClean="0"/>
-              <a:t>20.07.2019</a:t>
+              <a:t>23. Jul. 2019</a:t>
             </a:fld>
             <a:endParaRPr lang="de-DE"/>
           </a:p>
@@ -816,7 +1045,7 @@
           <a:p>
             <a:fld id="{C3DB19C7-2C0D-4B6D-9AA5-D2D83B8D3278}" type="datetimeFigureOut">
               <a:rPr lang="de-DE" smtClean="0"/>
-              <a:t>20.07.2019</a:t>
+              <a:t>23. Jul. 2019</a:t>
             </a:fld>
             <a:endParaRPr lang="de-DE"/>
           </a:p>
@@ -1061,7 +1290,7 @@
           <a:p>
             <a:fld id="{C3DB19C7-2C0D-4B6D-9AA5-D2D83B8D3278}" type="datetimeFigureOut">
               <a:rPr lang="de-DE" smtClean="0"/>
-              <a:t>20.07.2019</a:t>
+              <a:t>23. Jul. 2019</a:t>
             </a:fld>
             <a:endParaRPr lang="de-DE"/>
           </a:p>
@@ -1346,7 +1575,7 @@
           <a:p>
             <a:fld id="{C3DB19C7-2C0D-4B6D-9AA5-D2D83B8D3278}" type="datetimeFigureOut">
               <a:rPr lang="de-DE" smtClean="0"/>
-              <a:t>20.07.2019</a:t>
+              <a:t>23. Jul. 2019</a:t>
             </a:fld>
             <a:endParaRPr lang="de-DE"/>
           </a:p>
@@ -1765,7 +1994,7 @@
           <a:p>
             <a:fld id="{C3DB19C7-2C0D-4B6D-9AA5-D2D83B8D3278}" type="datetimeFigureOut">
               <a:rPr lang="de-DE" smtClean="0"/>
-              <a:t>20.07.2019</a:t>
+              <a:t>23. Jul. 2019</a:t>
             </a:fld>
             <a:endParaRPr lang="de-DE"/>
           </a:p>
@@ -1882,7 +2111,7 @@
           <a:p>
             <a:fld id="{C3DB19C7-2C0D-4B6D-9AA5-D2D83B8D3278}" type="datetimeFigureOut">
               <a:rPr lang="de-DE" smtClean="0"/>
-              <a:t>20.07.2019</a:t>
+              <a:t>23. Jul. 2019</a:t>
             </a:fld>
             <a:endParaRPr lang="de-DE"/>
           </a:p>
@@ -1977,7 +2206,7 @@
           <a:p>
             <a:fld id="{C3DB19C7-2C0D-4B6D-9AA5-D2D83B8D3278}" type="datetimeFigureOut">
               <a:rPr lang="de-DE" smtClean="0"/>
-              <a:t>20.07.2019</a:t>
+              <a:t>23. Jul. 2019</a:t>
             </a:fld>
             <a:endParaRPr lang="de-DE"/>
           </a:p>
@@ -2252,7 +2481,7 @@
           <a:p>
             <a:fld id="{C3DB19C7-2C0D-4B6D-9AA5-D2D83B8D3278}" type="datetimeFigureOut">
               <a:rPr lang="de-DE" smtClean="0"/>
-              <a:t>20.07.2019</a:t>
+              <a:t>23. Jul. 2019</a:t>
             </a:fld>
             <a:endParaRPr lang="de-DE"/>
           </a:p>
@@ -2504,7 +2733,7 @@
           <a:p>
             <a:fld id="{C3DB19C7-2C0D-4B6D-9AA5-D2D83B8D3278}" type="datetimeFigureOut">
               <a:rPr lang="de-DE" smtClean="0"/>
-              <a:t>20.07.2019</a:t>
+              <a:t>23. Jul. 2019</a:t>
             </a:fld>
             <a:endParaRPr lang="de-DE"/>
           </a:p>
@@ -2715,7 +2944,7 @@
           <a:p>
             <a:fld id="{C3DB19C7-2C0D-4B6D-9AA5-D2D83B8D3278}" type="datetimeFigureOut">
               <a:rPr lang="de-DE" smtClean="0"/>
-              <a:t>20.07.2019</a:t>
+              <a:t>23. Jul. 2019</a:t>
             </a:fld>
             <a:endParaRPr lang="de-DE"/>
           </a:p>
@@ -3099,14 +3328,14 @@
           <p:nvPr>
             <p:extLst>
               <p:ext uri="{D42A27DB-BD31-4B8C-83A1-F6EECF244321}">
-                <p14:modId xmlns:p14="http://schemas.microsoft.com/office/powerpoint/2010/main" val="3092667241"/>
+                <p14:modId xmlns:p14="http://schemas.microsoft.com/office/powerpoint/2010/main" val="2872560162"/>
               </p:ext>
             </p:extLst>
           </p:nvPr>
         </p:nvGraphicFramePr>
         <p:xfrm>
           <a:off x="244810" y="252240"/>
-          <a:ext cx="29936410" cy="19658689"/>
+          <a:ext cx="29936410" cy="22314408"/>
         </p:xfrm>
         <a:graphic>
           <a:graphicData uri="http://schemas.openxmlformats.org/drawingml/2006/table">
@@ -3563,7 +3792,7 @@
                   </a:ext>
                 </a:extLst>
               </a:tr>
-              <a:tr h="5055415">
+              <a:tr h="8538359">
                 <a:tc>
                   <a:txBody>
                     <a:bodyPr/>
@@ -4763,13 +4992,13 @@
       </p:graphicFrame>
       <p:pic>
         <p:nvPicPr>
-          <p:cNvPr id="2075" name="Picture 27" descr="H:\12FI4\SOLID_Prinzipien\SOLID_S_Report.PNG"/>
+          <p:cNvPr id="2075" name="Picture 27"/>
           <p:cNvPicPr>
             <a:picLocks noChangeAspect="1" noChangeArrowheads="1"/>
           </p:cNvPicPr>
           <p:nvPr/>
         </p:nvPicPr>
-        <p:blipFill rotWithShape="1">
+        <p:blipFill>
           <a:blip r:embed="rId2">
             <a:extLst>
               <a:ext uri="{28A0092B-C50C-407E-A947-70E740481C1C}">
@@ -4777,13 +5006,13 @@
               </a:ext>
             </a:extLst>
           </a:blip>
-          <a:srcRect r="51947" b="19404"/>
+          <a:srcRect/>
           <a:stretch/>
         </p:blipFill>
         <p:spPr bwMode="auto">
           <a:xfrm>
-            <a:off x="373112" y="8190695"/>
-            <a:ext cx="5796922" cy="4619266"/>
+            <a:off x="244808" y="8614353"/>
+            <a:ext cx="5408075" cy="11176688"/>
           </a:xfrm>
           <a:prstGeom prst="rect">
             <a:avLst/>
@@ -4800,1347 +5029,6 @@
           </a:extLst>
         </p:spPr>
       </p:pic>
-      <p:pic>
-        <p:nvPicPr>
-          <p:cNvPr id="2076" name="Picture 28" descr="H:\12FI4\SOLID_Prinzipien\SOLID_S_Report.PNG"/>
-          <p:cNvPicPr>
-            <a:picLocks noChangeAspect="1" noChangeArrowheads="1"/>
-          </p:cNvPicPr>
-          <p:nvPr/>
-        </p:nvPicPr>
-        <p:blipFill rotWithShape="1">
-          <a:blip r:embed="rId2">
-            <a:extLst>
-              <a:ext uri="{28A0092B-C50C-407E-A947-70E740481C1C}">
-                <a14:useLocalDpi xmlns:a14="http://schemas.microsoft.com/office/drawing/2010/main" val="0"/>
-              </a:ext>
-            </a:extLst>
-          </a:blip>
-          <a:srcRect l="51784" b="55"/>
-          <a:stretch/>
-        </p:blipFill>
-        <p:spPr bwMode="auto">
-          <a:xfrm>
-            <a:off x="605809" y="13604877"/>
-            <a:ext cx="5232792" cy="5153419"/>
-          </a:xfrm>
-          <a:prstGeom prst="rect">
-            <a:avLst/>
-          </a:prstGeom>
-          <a:noFill/>
-          <a:extLst>
-            <a:ext uri="{909E8E84-426E-40DD-AFC4-6F175D3DCCD1}">
-              <a14:hiddenFill xmlns:a14="http://schemas.microsoft.com/office/drawing/2010/main">
-                <a:solidFill>
-                  <a:srgbClr val="FFFFFF"/>
-                </a:solidFill>
-              </a14:hiddenFill>
-            </a:ext>
-          </a:extLst>
-        </p:spPr>
-      </p:pic>
-      <p:pic>
-        <p:nvPicPr>
-          <p:cNvPr id="13" name="Picture 32" descr="H:\12FI4\SOLID_Prinzipien\SOLID_L_UML.PNG"/>
-          <p:cNvPicPr>
-            <a:picLocks noChangeAspect="1" noChangeArrowheads="1"/>
-          </p:cNvPicPr>
-          <p:nvPr/>
-        </p:nvPicPr>
-        <p:blipFill rotWithShape="1">
-          <a:blip r:embed="rId3">
-            <a:extLst>
-              <a:ext uri="{28A0092B-C50C-407E-A947-70E740481C1C}">
-                <a14:useLocalDpi xmlns:a14="http://schemas.microsoft.com/office/drawing/2010/main" val="0"/>
-              </a:ext>
-            </a:extLst>
-          </a:blip>
-          <a:srcRect l="68410" t="3025" r="10079" b="59697"/>
-          <a:stretch/>
-        </p:blipFill>
-        <p:spPr bwMode="auto">
-          <a:xfrm>
-            <a:off x="13339787" y="9795408"/>
-            <a:ext cx="3603498" cy="2658890"/>
-          </a:xfrm>
-          <a:prstGeom prst="rect">
-            <a:avLst/>
-          </a:prstGeom>
-          <a:noFill/>
-          <a:extLst>
-            <a:ext uri="{909E8E84-426E-40DD-AFC4-6F175D3DCCD1}">
-              <a14:hiddenFill xmlns:a14="http://schemas.microsoft.com/office/drawing/2010/main">
-                <a:solidFill>
-                  <a:srgbClr val="FFFFFF"/>
-                </a:solidFill>
-              </a14:hiddenFill>
-            </a:ext>
-          </a:extLst>
-        </p:spPr>
-      </p:pic>
-      <p:pic>
-        <p:nvPicPr>
-          <p:cNvPr id="15" name="Picture 32" descr="H:\12FI4\SOLID_Prinzipien\SOLID_L_UML.PNG"/>
-          <p:cNvPicPr>
-            <a:picLocks noChangeAspect="1" noChangeArrowheads="1"/>
-          </p:cNvPicPr>
-          <p:nvPr/>
-        </p:nvPicPr>
-        <p:blipFill rotWithShape="1">
-          <a:blip r:embed="rId3">
-            <a:extLst>
-              <a:ext uri="{28A0092B-C50C-407E-A947-70E740481C1C}">
-                <a14:useLocalDpi xmlns:a14="http://schemas.microsoft.com/office/drawing/2010/main" val="0"/>
-              </a:ext>
-            </a:extLst>
-          </a:blip>
-          <a:srcRect l="64442" t="57962"/>
-          <a:stretch/>
-        </p:blipFill>
-        <p:spPr bwMode="auto">
-          <a:xfrm>
-            <a:off x="12324732" y="14410996"/>
-            <a:ext cx="5627754" cy="2832872"/>
-          </a:xfrm>
-          <a:prstGeom prst="rect">
-            <a:avLst/>
-          </a:prstGeom>
-          <a:noFill/>
-          <a:extLst>
-            <a:ext uri="{909E8E84-426E-40DD-AFC4-6F175D3DCCD1}">
-              <a14:hiddenFill xmlns:a14="http://schemas.microsoft.com/office/drawing/2010/main">
-                <a:solidFill>
-                  <a:srgbClr val="FFFFFF"/>
-                </a:solidFill>
-              </a14:hiddenFill>
-            </a:ext>
-          </a:extLst>
-        </p:spPr>
-      </p:pic>
-      <p:pic>
-        <p:nvPicPr>
-          <p:cNvPr id="2" name="Picture 2"/>
-          <p:cNvPicPr>
-            <a:picLocks noChangeAspect="1" noChangeArrowheads="1"/>
-          </p:cNvPicPr>
-          <p:nvPr/>
-        </p:nvPicPr>
-        <p:blipFill>
-          <a:blip r:embed="rId4">
-            <a:extLst>
-              <a:ext uri="{28A0092B-C50C-407E-A947-70E740481C1C}">
-                <a14:useLocalDpi xmlns:a14="http://schemas.microsoft.com/office/drawing/2010/main" val="0"/>
-              </a:ext>
-            </a:extLst>
-          </a:blip>
-          <a:srcRect/>
-          <a:stretch>
-            <a:fillRect/>
-          </a:stretch>
-        </p:blipFill>
-        <p:spPr bwMode="auto">
-          <a:xfrm>
-            <a:off x="12403683" y="7999105"/>
-            <a:ext cx="5627754" cy="1524373"/>
-          </a:xfrm>
-          <a:prstGeom prst="rect">
-            <a:avLst/>
-          </a:prstGeom>
-          <a:noFill/>
-          <a:ln>
-            <a:noFill/>
-          </a:ln>
-          <a:effectLst/>
-          <a:extLst>
-            <a:ext uri="{909E8E84-426E-40DD-AFC4-6F175D3DCCD1}">
-              <a14:hiddenFill xmlns:a14="http://schemas.microsoft.com/office/drawing/2010/main">
-                <a:solidFill>
-                  <a:schemeClr val="accent1"/>
-                </a:solidFill>
-              </a14:hiddenFill>
-            </a:ext>
-            <a:ext uri="{91240B29-F687-4F45-9708-019B960494DF}">
-              <a14:hiddenLine xmlns:a14="http://schemas.microsoft.com/office/drawing/2010/main" w="9525">
-                <a:solidFill>
-                  <a:schemeClr val="tx1"/>
-                </a:solidFill>
-                <a:miter lim="800000"/>
-                <a:headEnd/>
-                <a:tailEnd/>
-              </a14:hiddenLine>
-            </a:ext>
-            <a:ext uri="{AF507438-7753-43E0-B8FC-AC1667EBCBE1}">
-              <a14:hiddenEffects xmlns:a14="http://schemas.microsoft.com/office/drawing/2010/main">
-                <a:effectLst>
-                  <a:outerShdw dist="35921" dir="2700000" algn="ctr" rotWithShape="0">
-                    <a:schemeClr val="bg2"/>
-                  </a:outerShdw>
-                </a:effectLst>
-              </a14:hiddenEffects>
-            </a:ext>
-          </a:extLst>
-        </p:spPr>
-      </p:pic>
-      <p:cxnSp>
-        <p:nvCxnSpPr>
-          <p:cNvPr id="9" name="Gerade Verbindung 8"/>
-          <p:cNvCxnSpPr/>
-          <p:nvPr/>
-        </p:nvCxnSpPr>
-        <p:spPr>
-          <a:xfrm>
-            <a:off x="244810" y="13090985"/>
-            <a:ext cx="5954787" cy="0"/>
-          </a:xfrm>
-          <a:prstGeom prst="line">
-            <a:avLst/>
-          </a:prstGeom>
-          <a:ln w="19050">
-            <a:prstDash val="dash"/>
-          </a:ln>
-        </p:spPr>
-        <p:style>
-          <a:lnRef idx="1">
-            <a:schemeClr val="accent1"/>
-          </a:lnRef>
-          <a:fillRef idx="0">
-            <a:schemeClr val="accent1"/>
-          </a:fillRef>
-          <a:effectRef idx="0">
-            <a:schemeClr val="accent1"/>
-          </a:effectRef>
-          <a:fontRef idx="minor">
-            <a:schemeClr val="tx1"/>
-          </a:fontRef>
-        </p:style>
-      </p:cxnSp>
-      <p:sp>
-        <p:nvSpPr>
-          <p:cNvPr id="10" name="Ellipse 9"/>
-          <p:cNvSpPr/>
-          <p:nvPr/>
-        </p:nvSpPr>
-        <p:spPr>
-          <a:xfrm rot="1459511">
-            <a:off x="820413" y="8763520"/>
-            <a:ext cx="1051847" cy="1519916"/>
-          </a:xfrm>
-          <a:prstGeom prst="ellipse">
-            <a:avLst/>
-          </a:prstGeom>
-          <a:noFill/>
-          <a:ln w="28575">
-            <a:solidFill>
-              <a:srgbClr val="FF0000"/>
-            </a:solidFill>
-          </a:ln>
-        </p:spPr>
-        <p:style>
-          <a:lnRef idx="2">
-            <a:schemeClr val="accent1">
-              <a:shade val="50000"/>
-            </a:schemeClr>
-          </a:lnRef>
-          <a:fillRef idx="1">
-            <a:schemeClr val="accent1"/>
-          </a:fillRef>
-          <a:effectRef idx="0">
-            <a:schemeClr val="accent1"/>
-          </a:effectRef>
-          <a:fontRef idx="minor">
-            <a:schemeClr val="lt1"/>
-          </a:fontRef>
-        </p:style>
-        <p:txBody>
-          <a:bodyPr rtlCol="0" anchor="ctr"/>
-          <a:lstStyle/>
-          <a:p>
-            <a:pPr algn="ctr"/>
-            <a:endParaRPr lang="de-DE"/>
-          </a:p>
-        </p:txBody>
-      </p:sp>
-      <p:sp>
-        <p:nvSpPr>
-          <p:cNvPr id="36" name="Ellipse 35"/>
-          <p:cNvSpPr/>
-          <p:nvPr/>
-        </p:nvSpPr>
-        <p:spPr>
-          <a:xfrm rot="3400373">
-            <a:off x="1245049" y="14171280"/>
-            <a:ext cx="729418" cy="1028746"/>
-          </a:xfrm>
-          <a:prstGeom prst="ellipse">
-            <a:avLst/>
-          </a:prstGeom>
-          <a:noFill/>
-          <a:ln w="28575">
-            <a:solidFill>
-              <a:srgbClr val="FF0000"/>
-            </a:solidFill>
-          </a:ln>
-        </p:spPr>
-        <p:style>
-          <a:lnRef idx="2">
-            <a:schemeClr val="accent1">
-              <a:shade val="50000"/>
-            </a:schemeClr>
-          </a:lnRef>
-          <a:fillRef idx="1">
-            <a:schemeClr val="accent1"/>
-          </a:fillRef>
-          <a:effectRef idx="0">
-            <a:schemeClr val="accent1"/>
-          </a:effectRef>
-          <a:fontRef idx="minor">
-            <a:schemeClr val="lt1"/>
-          </a:fontRef>
-        </p:style>
-        <p:txBody>
-          <a:bodyPr rtlCol="0" anchor="ctr"/>
-          <a:lstStyle/>
-          <a:p>
-            <a:pPr algn="ctr"/>
-            <a:endParaRPr lang="de-DE"/>
-          </a:p>
-        </p:txBody>
-      </p:sp>
-      <p:sp>
-        <p:nvSpPr>
-          <p:cNvPr id="37" name="Ellipse 36"/>
-          <p:cNvSpPr/>
-          <p:nvPr/>
-        </p:nvSpPr>
-        <p:spPr>
-          <a:xfrm rot="2592741">
-            <a:off x="1345571" y="14981068"/>
-            <a:ext cx="585613" cy="900728"/>
-          </a:xfrm>
-          <a:prstGeom prst="ellipse">
-            <a:avLst/>
-          </a:prstGeom>
-          <a:noFill/>
-          <a:ln w="28575">
-            <a:solidFill>
-              <a:srgbClr val="FFC000"/>
-            </a:solidFill>
-          </a:ln>
-        </p:spPr>
-        <p:style>
-          <a:lnRef idx="2">
-            <a:schemeClr val="accent1">
-              <a:shade val="50000"/>
-            </a:schemeClr>
-          </a:lnRef>
-          <a:fillRef idx="1">
-            <a:schemeClr val="accent1"/>
-          </a:fillRef>
-          <a:effectRef idx="0">
-            <a:schemeClr val="accent1"/>
-          </a:effectRef>
-          <a:fontRef idx="minor">
-            <a:schemeClr val="lt1"/>
-          </a:fontRef>
-        </p:style>
-        <p:txBody>
-          <a:bodyPr rtlCol="0" anchor="ctr"/>
-          <a:lstStyle/>
-          <a:p>
-            <a:pPr algn="ctr"/>
-            <a:endParaRPr lang="de-DE"/>
-          </a:p>
-        </p:txBody>
-      </p:sp>
-      <p:sp>
-        <p:nvSpPr>
-          <p:cNvPr id="38" name="Ellipse 37"/>
-          <p:cNvSpPr/>
-          <p:nvPr/>
-        </p:nvSpPr>
-        <p:spPr>
-          <a:xfrm>
-            <a:off x="2610595" y="16181586"/>
-            <a:ext cx="1224136" cy="546798"/>
-          </a:xfrm>
-          <a:prstGeom prst="ellipse">
-            <a:avLst/>
-          </a:prstGeom>
-          <a:noFill/>
-          <a:ln w="28575">
-            <a:solidFill>
-              <a:srgbClr val="FF0000"/>
-            </a:solidFill>
-          </a:ln>
-        </p:spPr>
-        <p:style>
-          <a:lnRef idx="2">
-            <a:schemeClr val="accent1">
-              <a:shade val="50000"/>
-            </a:schemeClr>
-          </a:lnRef>
-          <a:fillRef idx="1">
-            <a:schemeClr val="accent1"/>
-          </a:fillRef>
-          <a:effectRef idx="0">
-            <a:schemeClr val="accent1"/>
-          </a:effectRef>
-          <a:fontRef idx="minor">
-            <a:schemeClr val="lt1"/>
-          </a:fontRef>
-        </p:style>
-        <p:txBody>
-          <a:bodyPr rtlCol="0" anchor="ctr"/>
-          <a:lstStyle/>
-          <a:p>
-            <a:pPr algn="ctr"/>
-            <a:endParaRPr lang="de-DE"/>
-          </a:p>
-        </p:txBody>
-      </p:sp>
-      <p:sp>
-        <p:nvSpPr>
-          <p:cNvPr id="39" name="Ellipse 38"/>
-          <p:cNvSpPr/>
-          <p:nvPr/>
-        </p:nvSpPr>
-        <p:spPr>
-          <a:xfrm>
-            <a:off x="2610136" y="17852378"/>
-            <a:ext cx="1224136" cy="432048"/>
-          </a:xfrm>
-          <a:prstGeom prst="ellipse">
-            <a:avLst/>
-          </a:prstGeom>
-          <a:noFill/>
-          <a:ln w="28575">
-            <a:solidFill>
-              <a:srgbClr val="FFC000"/>
-            </a:solidFill>
-          </a:ln>
-        </p:spPr>
-        <p:style>
-          <a:lnRef idx="2">
-            <a:schemeClr val="accent1">
-              <a:shade val="50000"/>
-            </a:schemeClr>
-          </a:lnRef>
-          <a:fillRef idx="1">
-            <a:schemeClr val="accent1"/>
-          </a:fillRef>
-          <a:effectRef idx="0">
-            <a:schemeClr val="accent1"/>
-          </a:effectRef>
-          <a:fontRef idx="minor">
-            <a:schemeClr val="lt1"/>
-          </a:fontRef>
-        </p:style>
-        <p:txBody>
-          <a:bodyPr rtlCol="0" anchor="ctr"/>
-          <a:lstStyle/>
-          <a:p>
-            <a:pPr algn="ctr"/>
-            <a:endParaRPr lang="de-DE"/>
-          </a:p>
-        </p:txBody>
-      </p:sp>
-      <p:sp>
-        <p:nvSpPr>
-          <p:cNvPr id="40" name="Ellipse 39"/>
-          <p:cNvSpPr/>
-          <p:nvPr/>
-        </p:nvSpPr>
-        <p:spPr>
-          <a:xfrm>
-            <a:off x="2323134" y="11097384"/>
-            <a:ext cx="1511138" cy="387002"/>
-          </a:xfrm>
-          <a:prstGeom prst="ellipse">
-            <a:avLst/>
-          </a:prstGeom>
-          <a:noFill/>
-          <a:ln w="28575">
-            <a:solidFill>
-              <a:srgbClr val="FF0000"/>
-            </a:solidFill>
-          </a:ln>
-        </p:spPr>
-        <p:style>
-          <a:lnRef idx="2">
-            <a:schemeClr val="accent1">
-              <a:shade val="50000"/>
-            </a:schemeClr>
-          </a:lnRef>
-          <a:fillRef idx="1">
-            <a:schemeClr val="accent1"/>
-          </a:fillRef>
-          <a:effectRef idx="0">
-            <a:schemeClr val="accent1"/>
-          </a:effectRef>
-          <a:fontRef idx="minor">
-            <a:schemeClr val="lt1"/>
-          </a:fontRef>
-        </p:style>
-        <p:txBody>
-          <a:bodyPr rtlCol="0" anchor="ctr"/>
-          <a:lstStyle/>
-          <a:p>
-            <a:pPr algn="ctr"/>
-            <a:endParaRPr lang="de-DE"/>
-          </a:p>
-        </p:txBody>
-      </p:sp>
-      <p:sp>
-        <p:nvSpPr>
-          <p:cNvPr id="11" name="Textfeld 10"/>
-          <p:cNvSpPr txBox="1"/>
-          <p:nvPr/>
-        </p:nvSpPr>
-        <p:spPr>
-          <a:xfrm>
-            <a:off x="102900" y="20414480"/>
-            <a:ext cx="4433889" cy="846386"/>
-          </a:xfrm>
-          <a:prstGeom prst="rect">
-            <a:avLst/>
-          </a:prstGeom>
-          <a:noFill/>
-        </p:spPr>
-        <p:txBody>
-          <a:bodyPr wrap="square" rtlCol="0">
-            <a:spAutoFit/>
-          </a:bodyPr>
-          <a:lstStyle/>
-          <a:p>
-            <a:r>
-              <a:rPr lang="de-DE" sz="1200" dirty="0"/>
-              <a:t>Quellen:</a:t>
-            </a:r>
-          </a:p>
-          <a:p>
-            <a:r>
-              <a:rPr lang="de-DE" sz="1200" dirty="0"/>
-              <a:t>https://code-maze.com/solid-principles/</a:t>
-            </a:r>
-          </a:p>
-          <a:p>
-            <a:r>
-              <a:rPr lang="de-DE" sz="1200" dirty="0"/>
-              <a:t>https://de.wikipedia.org/wiki/Prinzipien_objektorientierten_Designs</a:t>
-            </a:r>
-            <a:br>
-              <a:rPr lang="de-DE" sz="1400" dirty="0"/>
-            </a:br>
-            <a:r>
-              <a:rPr lang="de-DE" sz="1300" dirty="0"/>
-              <a:t>© Marc Montero </a:t>
-            </a:r>
-            <a:r>
-              <a:rPr lang="de-DE" sz="1300" dirty="0" err="1"/>
-              <a:t>Deistler</a:t>
-            </a:r>
-            <a:r>
-              <a:rPr lang="de-DE" sz="1300" dirty="0"/>
-              <a:t>, 12FI4 2018/19</a:t>
-            </a:r>
-          </a:p>
-        </p:txBody>
-      </p:sp>
-      <p:sp>
-        <p:nvSpPr>
-          <p:cNvPr id="42" name="Ellipse 41"/>
-          <p:cNvSpPr/>
-          <p:nvPr/>
-        </p:nvSpPr>
-        <p:spPr>
-          <a:xfrm>
-            <a:off x="14213351" y="9757296"/>
-            <a:ext cx="1777004" cy="418218"/>
-          </a:xfrm>
-          <a:prstGeom prst="ellipse">
-            <a:avLst/>
-          </a:prstGeom>
-          <a:noFill/>
-          <a:ln w="28575">
-            <a:solidFill>
-              <a:srgbClr val="FF0000"/>
-            </a:solidFill>
-          </a:ln>
-        </p:spPr>
-        <p:style>
-          <a:lnRef idx="2">
-            <a:schemeClr val="accent1">
-              <a:shade val="50000"/>
-            </a:schemeClr>
-          </a:lnRef>
-          <a:fillRef idx="1">
-            <a:schemeClr val="accent1"/>
-          </a:fillRef>
-          <a:effectRef idx="0">
-            <a:schemeClr val="accent1"/>
-          </a:effectRef>
-          <a:fontRef idx="minor">
-            <a:schemeClr val="lt1"/>
-          </a:fontRef>
-        </p:style>
-        <p:txBody>
-          <a:bodyPr rtlCol="0" anchor="ctr"/>
-          <a:lstStyle/>
-          <a:p>
-            <a:pPr algn="ctr"/>
-            <a:endParaRPr lang="de-DE"/>
-          </a:p>
-        </p:txBody>
-      </p:sp>
-      <p:sp>
-        <p:nvSpPr>
-          <p:cNvPr id="43" name="Ellipse 42"/>
-          <p:cNvSpPr/>
-          <p:nvPr/>
-        </p:nvSpPr>
-        <p:spPr>
-          <a:xfrm>
-            <a:off x="12698657" y="8449380"/>
-            <a:ext cx="1777004" cy="418218"/>
-          </a:xfrm>
-          <a:prstGeom prst="ellipse">
-            <a:avLst/>
-          </a:prstGeom>
-          <a:noFill/>
-          <a:ln w="28575">
-            <a:solidFill>
-              <a:srgbClr val="FF0000"/>
-            </a:solidFill>
-          </a:ln>
-        </p:spPr>
-        <p:style>
-          <a:lnRef idx="2">
-            <a:schemeClr val="accent1">
-              <a:shade val="50000"/>
-            </a:schemeClr>
-          </a:lnRef>
-          <a:fillRef idx="1">
-            <a:schemeClr val="accent1"/>
-          </a:fillRef>
-          <a:effectRef idx="0">
-            <a:schemeClr val="accent1"/>
-          </a:effectRef>
-          <a:fontRef idx="minor">
-            <a:schemeClr val="lt1"/>
-          </a:fontRef>
-        </p:style>
-        <p:txBody>
-          <a:bodyPr rtlCol="0" anchor="ctr"/>
-          <a:lstStyle/>
-          <a:p>
-            <a:pPr algn="ctr"/>
-            <a:endParaRPr lang="de-DE"/>
-          </a:p>
-        </p:txBody>
-      </p:sp>
-      <p:sp>
-        <p:nvSpPr>
-          <p:cNvPr id="44" name="Ellipse 43"/>
-          <p:cNvSpPr/>
-          <p:nvPr/>
-        </p:nvSpPr>
-        <p:spPr>
-          <a:xfrm>
-            <a:off x="13627819" y="11412412"/>
-            <a:ext cx="2952328" cy="418218"/>
-          </a:xfrm>
-          <a:prstGeom prst="ellipse">
-            <a:avLst/>
-          </a:prstGeom>
-          <a:noFill/>
-          <a:ln w="28575">
-            <a:solidFill>
-              <a:srgbClr val="FFC000"/>
-            </a:solidFill>
-          </a:ln>
-        </p:spPr>
-        <p:style>
-          <a:lnRef idx="2">
-            <a:schemeClr val="accent1">
-              <a:shade val="50000"/>
-            </a:schemeClr>
-          </a:lnRef>
-          <a:fillRef idx="1">
-            <a:schemeClr val="accent1"/>
-          </a:fillRef>
-          <a:effectRef idx="0">
-            <a:schemeClr val="accent1"/>
-          </a:effectRef>
-          <a:fontRef idx="minor">
-            <a:schemeClr val="lt1"/>
-          </a:fontRef>
-        </p:style>
-        <p:txBody>
-          <a:bodyPr rtlCol="0" anchor="ctr"/>
-          <a:lstStyle/>
-          <a:p>
-            <a:pPr algn="ctr"/>
-            <a:r>
-              <a:rPr lang="de-DE" dirty="0"/>
-              <a:t>  </a:t>
-            </a:r>
-          </a:p>
-        </p:txBody>
-      </p:sp>
-      <p:sp>
-        <p:nvSpPr>
-          <p:cNvPr id="45" name="Ellipse 44"/>
-          <p:cNvSpPr/>
-          <p:nvPr/>
-        </p:nvSpPr>
-        <p:spPr>
-          <a:xfrm>
-            <a:off x="14786889" y="8492204"/>
-            <a:ext cx="2016224" cy="353125"/>
-          </a:xfrm>
-          <a:prstGeom prst="ellipse">
-            <a:avLst/>
-          </a:prstGeom>
-          <a:noFill/>
-          <a:ln w="28575">
-            <a:solidFill>
-              <a:srgbClr val="FFC000"/>
-            </a:solidFill>
-          </a:ln>
-        </p:spPr>
-        <p:style>
-          <a:lnRef idx="2">
-            <a:schemeClr val="accent1">
-              <a:shade val="50000"/>
-            </a:schemeClr>
-          </a:lnRef>
-          <a:fillRef idx="1">
-            <a:schemeClr val="accent1"/>
-          </a:fillRef>
-          <a:effectRef idx="0">
-            <a:schemeClr val="accent1"/>
-          </a:effectRef>
-          <a:fontRef idx="minor">
-            <a:schemeClr val="lt1"/>
-          </a:fontRef>
-        </p:style>
-        <p:txBody>
-          <a:bodyPr rtlCol="0" anchor="ctr"/>
-          <a:lstStyle/>
-          <a:p>
-            <a:pPr algn="ctr"/>
-            <a:endParaRPr lang="de-DE"/>
-          </a:p>
-        </p:txBody>
-      </p:sp>
-      <p:sp>
-        <p:nvSpPr>
-          <p:cNvPr id="46" name="Ellipse 45"/>
-          <p:cNvSpPr/>
-          <p:nvPr/>
-        </p:nvSpPr>
-        <p:spPr>
-          <a:xfrm>
-            <a:off x="16307441" y="8658489"/>
-            <a:ext cx="1650483" cy="353125"/>
-          </a:xfrm>
-          <a:prstGeom prst="ellipse">
-            <a:avLst/>
-          </a:prstGeom>
-          <a:noFill/>
-          <a:ln w="28575">
-            <a:solidFill>
-              <a:srgbClr val="00B050"/>
-            </a:solidFill>
-          </a:ln>
-        </p:spPr>
-        <p:style>
-          <a:lnRef idx="2">
-            <a:schemeClr val="accent1">
-              <a:shade val="50000"/>
-            </a:schemeClr>
-          </a:lnRef>
-          <a:fillRef idx="1">
-            <a:schemeClr val="accent1"/>
-          </a:fillRef>
-          <a:effectRef idx="0">
-            <a:schemeClr val="accent1"/>
-          </a:effectRef>
-          <a:fontRef idx="minor">
-            <a:schemeClr val="lt1"/>
-          </a:fontRef>
-        </p:style>
-        <p:txBody>
-          <a:bodyPr rtlCol="0" anchor="ctr"/>
-          <a:lstStyle/>
-          <a:p>
-            <a:pPr algn="ctr"/>
-            <a:endParaRPr lang="de-DE"/>
-          </a:p>
-        </p:txBody>
-      </p:sp>
-      <p:sp>
-        <p:nvSpPr>
-          <p:cNvPr id="47" name="Ellipse 46"/>
-          <p:cNvSpPr/>
-          <p:nvPr/>
-        </p:nvSpPr>
-        <p:spPr>
-          <a:xfrm>
-            <a:off x="12403683" y="16548824"/>
-            <a:ext cx="1650483" cy="353125"/>
-          </a:xfrm>
-          <a:prstGeom prst="ellipse">
-            <a:avLst/>
-          </a:prstGeom>
-          <a:noFill/>
-          <a:ln w="28575">
-            <a:solidFill>
-              <a:srgbClr val="00B050"/>
-            </a:solidFill>
-          </a:ln>
-        </p:spPr>
-        <p:style>
-          <a:lnRef idx="2">
-            <a:schemeClr val="accent1">
-              <a:shade val="50000"/>
-            </a:schemeClr>
-          </a:lnRef>
-          <a:fillRef idx="1">
-            <a:schemeClr val="accent1"/>
-          </a:fillRef>
-          <a:effectRef idx="0">
-            <a:schemeClr val="accent1"/>
-          </a:effectRef>
-          <a:fontRef idx="minor">
-            <a:schemeClr val="lt1"/>
-          </a:fontRef>
-        </p:style>
-        <p:txBody>
-          <a:bodyPr rtlCol="0" anchor="ctr"/>
-          <a:lstStyle/>
-          <a:p>
-            <a:pPr algn="ctr"/>
-            <a:endParaRPr lang="de-DE"/>
-          </a:p>
-        </p:txBody>
-      </p:sp>
-      <p:sp>
-        <p:nvSpPr>
-          <p:cNvPr id="48" name="Ellipse 47"/>
-          <p:cNvSpPr/>
-          <p:nvPr/>
-        </p:nvSpPr>
-        <p:spPr>
-          <a:xfrm>
-            <a:off x="14347899" y="10173014"/>
-            <a:ext cx="1697824" cy="353125"/>
-          </a:xfrm>
-          <a:prstGeom prst="ellipse">
-            <a:avLst/>
-          </a:prstGeom>
-          <a:noFill/>
-          <a:ln w="28575">
-            <a:solidFill>
-              <a:srgbClr val="00B050"/>
-            </a:solidFill>
-          </a:ln>
-        </p:spPr>
-        <p:style>
-          <a:lnRef idx="2">
-            <a:schemeClr val="accent1">
-              <a:shade val="50000"/>
-            </a:schemeClr>
-          </a:lnRef>
-          <a:fillRef idx="1">
-            <a:schemeClr val="accent1"/>
-          </a:fillRef>
-          <a:effectRef idx="0">
-            <a:schemeClr val="accent1"/>
-          </a:effectRef>
-          <a:fontRef idx="minor">
-            <a:schemeClr val="lt1"/>
-          </a:fontRef>
-        </p:style>
-        <p:txBody>
-          <a:bodyPr rtlCol="0" anchor="ctr"/>
-          <a:lstStyle/>
-          <a:p>
-            <a:pPr algn="ctr"/>
-            <a:endParaRPr lang="de-DE"/>
-          </a:p>
-        </p:txBody>
-      </p:sp>
-      <p:sp>
-        <p:nvSpPr>
-          <p:cNvPr id="51" name="Ellipse 50"/>
-          <p:cNvSpPr/>
-          <p:nvPr/>
-        </p:nvSpPr>
-        <p:spPr>
-          <a:xfrm>
-            <a:off x="12547699" y="16166008"/>
-            <a:ext cx="2952328" cy="418218"/>
-          </a:xfrm>
-          <a:prstGeom prst="ellipse">
-            <a:avLst/>
-          </a:prstGeom>
-          <a:noFill/>
-          <a:ln w="28575">
-            <a:solidFill>
-              <a:srgbClr val="FFC000"/>
-            </a:solidFill>
-          </a:ln>
-        </p:spPr>
-        <p:style>
-          <a:lnRef idx="2">
-            <a:schemeClr val="accent1">
-              <a:shade val="50000"/>
-            </a:schemeClr>
-          </a:lnRef>
-          <a:fillRef idx="1">
-            <a:schemeClr val="accent1"/>
-          </a:fillRef>
-          <a:effectRef idx="0">
-            <a:schemeClr val="accent1"/>
-          </a:effectRef>
-          <a:fontRef idx="minor">
-            <a:schemeClr val="lt1"/>
-          </a:fontRef>
-        </p:style>
-        <p:txBody>
-          <a:bodyPr rtlCol="0" anchor="ctr"/>
-          <a:lstStyle/>
-          <a:p>
-            <a:pPr algn="ctr"/>
-            <a:r>
-              <a:rPr lang="de-DE" dirty="0"/>
-              <a:t>  </a:t>
-            </a:r>
-          </a:p>
-        </p:txBody>
-      </p:sp>
-      <p:sp>
-        <p:nvSpPr>
-          <p:cNvPr id="54" name="Ellipse 53"/>
-          <p:cNvSpPr/>
-          <p:nvPr/>
-        </p:nvSpPr>
-        <p:spPr>
-          <a:xfrm>
-            <a:off x="15201550" y="14725848"/>
-            <a:ext cx="1234580" cy="288032"/>
-          </a:xfrm>
-          <a:prstGeom prst="ellipse">
-            <a:avLst/>
-          </a:prstGeom>
-          <a:noFill/>
-          <a:ln w="28575">
-            <a:solidFill>
-              <a:schemeClr val="accent6">
-                <a:lumMod val="50000"/>
-              </a:schemeClr>
-            </a:solidFill>
-          </a:ln>
-        </p:spPr>
-        <p:style>
-          <a:lnRef idx="2">
-            <a:schemeClr val="accent1">
-              <a:shade val="50000"/>
-            </a:schemeClr>
-          </a:lnRef>
-          <a:fillRef idx="1">
-            <a:schemeClr val="accent1"/>
-          </a:fillRef>
-          <a:effectRef idx="0">
-            <a:schemeClr val="accent1"/>
-          </a:effectRef>
-          <a:fontRef idx="minor">
-            <a:schemeClr val="lt1"/>
-          </a:fontRef>
-        </p:style>
-        <p:txBody>
-          <a:bodyPr rtlCol="0" anchor="ctr"/>
-          <a:lstStyle/>
-          <a:p>
-            <a:pPr algn="ctr"/>
-            <a:r>
-              <a:rPr lang="de-DE" dirty="0"/>
-              <a:t>  </a:t>
-            </a:r>
-          </a:p>
-        </p:txBody>
-      </p:sp>
-      <p:pic>
-        <p:nvPicPr>
-          <p:cNvPr id="20" name="Picture 4"/>
-          <p:cNvPicPr>
-            <a:picLocks noChangeAspect="1" noChangeArrowheads="1"/>
-          </p:cNvPicPr>
-          <p:nvPr/>
-        </p:nvPicPr>
-        <p:blipFill>
-          <a:blip r:embed="rId5">
-            <a:extLst>
-              <a:ext uri="{28A0092B-C50C-407E-A947-70E740481C1C}">
-                <a14:useLocalDpi xmlns:a14="http://schemas.microsoft.com/office/drawing/2010/main" val="0"/>
-              </a:ext>
-            </a:extLst>
-          </a:blip>
-          <a:srcRect/>
-          <a:stretch>
-            <a:fillRect/>
-          </a:stretch>
-        </p:blipFill>
-        <p:spPr bwMode="auto">
-          <a:xfrm>
-            <a:off x="12324733" y="13276592"/>
-            <a:ext cx="5627753" cy="1134404"/>
-          </a:xfrm>
-          <a:prstGeom prst="rect">
-            <a:avLst/>
-          </a:prstGeom>
-          <a:noFill/>
-          <a:ln>
-            <a:noFill/>
-          </a:ln>
-          <a:extLst>
-            <a:ext uri="{909E8E84-426E-40DD-AFC4-6F175D3DCCD1}">
-              <a14:hiddenFill xmlns:a14="http://schemas.microsoft.com/office/drawing/2010/main">
-                <a:solidFill>
-                  <a:schemeClr val="accent1"/>
-                </a:solidFill>
-              </a14:hiddenFill>
-            </a:ext>
-            <a:ext uri="{91240B29-F687-4F45-9708-019B960494DF}">
-              <a14:hiddenLine xmlns:a14="http://schemas.microsoft.com/office/drawing/2010/main" w="9525">
-                <a:solidFill>
-                  <a:schemeClr val="tx1"/>
-                </a:solidFill>
-                <a:miter lim="800000"/>
-                <a:headEnd/>
-                <a:tailEnd/>
-              </a14:hiddenLine>
-            </a:ext>
-          </a:extLst>
-        </p:spPr>
-      </p:pic>
-      <p:sp>
-        <p:nvSpPr>
-          <p:cNvPr id="55" name="Ellipse 54"/>
-          <p:cNvSpPr/>
-          <p:nvPr/>
-        </p:nvSpPr>
-        <p:spPr>
-          <a:xfrm>
-            <a:off x="12655711" y="13946400"/>
-            <a:ext cx="1404156" cy="302098"/>
-          </a:xfrm>
-          <a:prstGeom prst="ellipse">
-            <a:avLst/>
-          </a:prstGeom>
-          <a:noFill/>
-          <a:ln w="28575">
-            <a:solidFill>
-              <a:schemeClr val="accent6">
-                <a:lumMod val="50000"/>
-              </a:schemeClr>
-            </a:solidFill>
-          </a:ln>
-        </p:spPr>
-        <p:style>
-          <a:lnRef idx="2">
-            <a:schemeClr val="accent1">
-              <a:shade val="50000"/>
-            </a:schemeClr>
-          </a:lnRef>
-          <a:fillRef idx="1">
-            <a:schemeClr val="accent1"/>
-          </a:fillRef>
-          <a:effectRef idx="0">
-            <a:schemeClr val="accent1"/>
-          </a:effectRef>
-          <a:fontRef idx="minor">
-            <a:schemeClr val="lt1"/>
-          </a:fontRef>
-        </p:style>
-        <p:txBody>
-          <a:bodyPr rtlCol="0" anchor="ctr"/>
-          <a:lstStyle/>
-          <a:p>
-            <a:pPr algn="ctr"/>
-            <a:r>
-              <a:rPr lang="de-DE" dirty="0"/>
-              <a:t>  </a:t>
-            </a:r>
-          </a:p>
-        </p:txBody>
-      </p:sp>
-      <p:sp>
-        <p:nvSpPr>
-          <p:cNvPr id="52" name="Ellipse 51"/>
-          <p:cNvSpPr/>
-          <p:nvPr/>
-        </p:nvSpPr>
-        <p:spPr>
-          <a:xfrm>
-            <a:off x="14396711" y="13929083"/>
-            <a:ext cx="2039419" cy="336732"/>
-          </a:xfrm>
-          <a:prstGeom prst="ellipse">
-            <a:avLst/>
-          </a:prstGeom>
-          <a:noFill/>
-          <a:ln w="28575">
-            <a:solidFill>
-              <a:srgbClr val="FFC000"/>
-            </a:solidFill>
-          </a:ln>
-        </p:spPr>
-        <p:style>
-          <a:lnRef idx="2">
-            <a:schemeClr val="accent1">
-              <a:shade val="50000"/>
-            </a:schemeClr>
-          </a:lnRef>
-          <a:fillRef idx="1">
-            <a:schemeClr val="accent1"/>
-          </a:fillRef>
-          <a:effectRef idx="0">
-            <a:schemeClr val="accent1"/>
-          </a:effectRef>
-          <a:fontRef idx="minor">
-            <a:schemeClr val="lt1"/>
-          </a:fontRef>
-        </p:style>
-        <p:txBody>
-          <a:bodyPr rtlCol="0" anchor="ctr"/>
-          <a:lstStyle/>
-          <a:p>
-            <a:pPr algn="ctr"/>
-            <a:r>
-              <a:rPr lang="de-DE" dirty="0"/>
-              <a:t>  </a:t>
-            </a:r>
-          </a:p>
-        </p:txBody>
-      </p:sp>
-      <p:sp>
-        <p:nvSpPr>
-          <p:cNvPr id="50" name="Ellipse 49"/>
-          <p:cNvSpPr/>
-          <p:nvPr/>
-        </p:nvSpPr>
-        <p:spPr>
-          <a:xfrm>
-            <a:off x="16227125" y="14135417"/>
-            <a:ext cx="1575793" cy="275580"/>
-          </a:xfrm>
-          <a:prstGeom prst="ellipse">
-            <a:avLst/>
-          </a:prstGeom>
-          <a:noFill/>
-          <a:ln w="28575">
-            <a:solidFill>
-              <a:srgbClr val="00B050"/>
-            </a:solidFill>
-          </a:ln>
-        </p:spPr>
-        <p:style>
-          <a:lnRef idx="2">
-            <a:schemeClr val="accent1">
-              <a:shade val="50000"/>
-            </a:schemeClr>
-          </a:lnRef>
-          <a:fillRef idx="1">
-            <a:schemeClr val="accent1"/>
-          </a:fillRef>
-          <a:effectRef idx="0">
-            <a:schemeClr val="accent1"/>
-          </a:effectRef>
-          <a:fontRef idx="minor">
-            <a:schemeClr val="lt1"/>
-          </a:fontRef>
-        </p:style>
-        <p:txBody>
-          <a:bodyPr rtlCol="0" anchor="ctr"/>
-          <a:lstStyle/>
-          <a:p>
-            <a:pPr algn="ctr"/>
-            <a:endParaRPr lang="de-DE"/>
-          </a:p>
-        </p:txBody>
-      </p:sp>
-      <p:cxnSp>
-        <p:nvCxnSpPr>
-          <p:cNvPr id="57" name="Gerade Verbindung 56"/>
-          <p:cNvCxnSpPr/>
-          <p:nvPr/>
-        </p:nvCxnSpPr>
-        <p:spPr>
-          <a:xfrm>
-            <a:off x="12187659" y="12853640"/>
-            <a:ext cx="5954787" cy="0"/>
-          </a:xfrm>
-          <a:prstGeom prst="line">
-            <a:avLst/>
-          </a:prstGeom>
-          <a:ln w="19050">
-            <a:prstDash val="dash"/>
-          </a:ln>
-        </p:spPr>
-        <p:style>
-          <a:lnRef idx="1">
-            <a:schemeClr val="accent1"/>
-          </a:lnRef>
-          <a:fillRef idx="0">
-            <a:schemeClr val="accent1"/>
-          </a:fillRef>
-          <a:effectRef idx="0">
-            <a:schemeClr val="accent1"/>
-          </a:effectRef>
-          <a:fontRef idx="minor">
-            <a:schemeClr val="tx1"/>
-          </a:fontRef>
-        </p:style>
-      </p:cxnSp>
-      <p:pic>
-        <p:nvPicPr>
-          <p:cNvPr id="1028" name="Picture 4"/>
-          <p:cNvPicPr>
-            <a:picLocks noChangeAspect="1" noChangeArrowheads="1"/>
-          </p:cNvPicPr>
-          <p:nvPr/>
-        </p:nvPicPr>
-        <p:blipFill rotWithShape="1">
-          <a:blip r:embed="rId6">
-            <a:extLst>
-              <a:ext uri="{28A0092B-C50C-407E-A947-70E740481C1C}">
-                <a14:useLocalDpi xmlns:a14="http://schemas.microsoft.com/office/drawing/2010/main" val="0"/>
-              </a:ext>
-            </a:extLst>
-          </a:blip>
-          <a:srcRect l="7424" r="15308" b="59803"/>
-          <a:stretch/>
-        </p:blipFill>
-        <p:spPr bwMode="auto">
-          <a:xfrm>
-            <a:off x="24323660" y="8367751"/>
-            <a:ext cx="5877589" cy="2397657"/>
-          </a:xfrm>
-          <a:prstGeom prst="rect">
-            <a:avLst/>
-          </a:prstGeom>
-          <a:noFill/>
-          <a:ln>
-            <a:noFill/>
-          </a:ln>
-          <a:extLst>
-            <a:ext uri="{909E8E84-426E-40DD-AFC4-6F175D3DCCD1}">
-              <a14:hiddenFill xmlns:a14="http://schemas.microsoft.com/office/drawing/2010/main">
-                <a:solidFill>
-                  <a:schemeClr val="accent1"/>
-                </a:solidFill>
-              </a14:hiddenFill>
-            </a:ext>
-            <a:ext uri="{91240B29-F687-4F45-9708-019B960494DF}">
-              <a14:hiddenLine xmlns:a14="http://schemas.microsoft.com/office/drawing/2010/main" w="9525">
-                <a:solidFill>
-                  <a:schemeClr val="tx1"/>
-                </a:solidFill>
-                <a:miter lim="800000"/>
-                <a:headEnd/>
-                <a:tailEnd/>
-              </a14:hiddenLine>
-            </a:ext>
-          </a:extLst>
-        </p:spPr>
-      </p:pic>
-      <p:pic>
-        <p:nvPicPr>
-          <p:cNvPr id="41" name="Picture 4"/>
-          <p:cNvPicPr>
-            <a:picLocks noChangeAspect="1" noChangeArrowheads="1"/>
-          </p:cNvPicPr>
-          <p:nvPr/>
-        </p:nvPicPr>
-        <p:blipFill rotWithShape="1">
-          <a:blip r:embed="rId6">
-            <a:extLst>
-              <a:ext uri="{28A0092B-C50C-407E-A947-70E740481C1C}">
-                <a14:useLocalDpi xmlns:a14="http://schemas.microsoft.com/office/drawing/2010/main" val="0"/>
-              </a:ext>
-            </a:extLst>
-          </a:blip>
-          <a:srcRect l="322" t="48282" r="63727" b="-1"/>
-          <a:stretch/>
-        </p:blipFill>
-        <p:spPr bwMode="auto">
-          <a:xfrm>
-            <a:off x="25991434" y="13314060"/>
-            <a:ext cx="2542042" cy="2867526"/>
-          </a:xfrm>
-          <a:prstGeom prst="rect">
-            <a:avLst/>
-          </a:prstGeom>
-          <a:noFill/>
-          <a:ln>
-            <a:noFill/>
-          </a:ln>
-          <a:extLst>
-            <a:ext uri="{909E8E84-426E-40DD-AFC4-6F175D3DCCD1}">
-              <a14:hiddenFill xmlns:a14="http://schemas.microsoft.com/office/drawing/2010/main">
-                <a:solidFill>
-                  <a:schemeClr val="accent1"/>
-                </a:solidFill>
-              </a14:hiddenFill>
-            </a:ext>
-            <a:ext uri="{91240B29-F687-4F45-9708-019B960494DF}">
-              <a14:hiddenLine xmlns:a14="http://schemas.microsoft.com/office/drawing/2010/main" w="9525">
-                <a:solidFill>
-                  <a:schemeClr val="tx1"/>
-                </a:solidFill>
-                <a:miter lim="800000"/>
-                <a:headEnd/>
-                <a:tailEnd/>
-              </a14:hiddenLine>
-            </a:ext>
-          </a:extLst>
-        </p:spPr>
-      </p:pic>
-      <p:cxnSp>
-        <p:nvCxnSpPr>
-          <p:cNvPr id="53" name="Gerade Verbindung 52"/>
-          <p:cNvCxnSpPr/>
-          <p:nvPr/>
-        </p:nvCxnSpPr>
-        <p:spPr>
-          <a:xfrm>
-            <a:off x="24068979" y="12853640"/>
-            <a:ext cx="5954787" cy="0"/>
-          </a:xfrm>
-          <a:prstGeom prst="line">
-            <a:avLst/>
-          </a:prstGeom>
-          <a:ln w="19050">
-            <a:prstDash val="dash"/>
-          </a:ln>
-        </p:spPr>
-        <p:style>
-          <a:lnRef idx="1">
-            <a:schemeClr val="accent1"/>
-          </a:lnRef>
-          <a:fillRef idx="0">
-            <a:schemeClr val="accent1"/>
-          </a:fillRef>
-          <a:effectRef idx="0">
-            <a:schemeClr val="accent1"/>
-          </a:effectRef>
-          <a:fontRef idx="minor">
-            <a:schemeClr val="tx1"/>
-          </a:fontRef>
-        </p:style>
-      </p:cxnSp>
       <p:sp>
         <p:nvSpPr>
           <p:cNvPr id="4" name="Textfeld 3">
@@ -6201,7 +5089,7 @@
           <p:nvPr/>
         </p:nvPicPr>
         <p:blipFill rotWithShape="1">
-          <a:blip r:embed="rId7">
+          <a:blip r:embed="rId3">
             <a:extLst>
               <a:ext uri="{28A0092B-C50C-407E-A947-70E740481C1C}">
                 <a14:useLocalDpi xmlns:a14="http://schemas.microsoft.com/office/drawing/2010/main" val="0"/>
@@ -6223,407 +5111,10 @@
       </p:pic>
       <p:pic>
         <p:nvPicPr>
-          <p:cNvPr id="21" name="Grafik 20">
+          <p:cNvPr id="8" name="Grafik 7">
             <a:extLst>
               <a:ext uri="{FF2B5EF4-FFF2-40B4-BE49-F238E27FC236}">
-                <a16:creationId xmlns:a16="http://schemas.microsoft.com/office/drawing/2014/main" id="{08713706-E203-4E91-828C-889524BD1D80}"/>
-              </a:ext>
-            </a:extLst>
-          </p:cNvPr>
-          <p:cNvPicPr>
-            <a:picLocks noChangeAspect="1"/>
-          </p:cNvPicPr>
-          <p:nvPr/>
-        </p:nvPicPr>
-        <p:blipFill rotWithShape="1">
-          <a:blip r:embed="rId8">
-            <a:extLst>
-              <a:ext uri="{28A0092B-C50C-407E-A947-70E740481C1C}">
-                <a14:useLocalDpi xmlns:a14="http://schemas.microsoft.com/office/drawing/2010/main" val="0"/>
-              </a:ext>
-            </a:extLst>
-          </a:blip>
-          <a:srcRect l="1403" r="1242"/>
-          <a:stretch/>
-        </p:blipFill>
-        <p:spPr>
-          <a:xfrm>
-            <a:off x="18308339" y="8503165"/>
-            <a:ext cx="5805259" cy="9030995"/>
-          </a:xfrm>
-          <a:prstGeom prst="rect">
-            <a:avLst/>
-          </a:prstGeom>
-        </p:spPr>
-      </p:pic>
-      <p:cxnSp>
-        <p:nvCxnSpPr>
-          <p:cNvPr id="58" name="Gerade Verbindung 57"/>
-          <p:cNvCxnSpPr/>
-          <p:nvPr/>
-        </p:nvCxnSpPr>
-        <p:spPr>
-          <a:xfrm>
-            <a:off x="18114192" y="12853640"/>
-            <a:ext cx="5954787" cy="0"/>
-          </a:xfrm>
-          <a:prstGeom prst="line">
-            <a:avLst/>
-          </a:prstGeom>
-          <a:ln w="19050">
-            <a:prstDash val="dash"/>
-          </a:ln>
-        </p:spPr>
-        <p:style>
-          <a:lnRef idx="1">
-            <a:schemeClr val="accent1"/>
-          </a:lnRef>
-          <a:fillRef idx="0">
-            <a:schemeClr val="accent1"/>
-          </a:fillRef>
-          <a:effectRef idx="0">
-            <a:schemeClr val="accent1"/>
-          </a:effectRef>
-          <a:fontRef idx="minor">
-            <a:schemeClr val="tx1"/>
-          </a:fontRef>
-        </p:style>
-      </p:cxnSp>
-      <p:grpSp>
-        <p:nvGrpSpPr>
-          <p:cNvPr id="29" name="Gruppieren 28">
-            <a:extLst>
-              <a:ext uri="{FF2B5EF4-FFF2-40B4-BE49-F238E27FC236}">
-                <a16:creationId xmlns:a16="http://schemas.microsoft.com/office/drawing/2014/main" id="{4956FF17-2A82-4D23-96F2-14C8ECE40F71}"/>
-              </a:ext>
-            </a:extLst>
-          </p:cNvPr>
-          <p:cNvGrpSpPr/>
-          <p:nvPr/>
-        </p:nvGrpSpPr>
-        <p:grpSpPr>
-          <a:xfrm>
-            <a:off x="6540769" y="8502520"/>
-            <a:ext cx="5232478" cy="11189858"/>
-            <a:chOff x="6543010" y="8009948"/>
-            <a:chExt cx="5232478" cy="11189858"/>
-          </a:xfrm>
-        </p:grpSpPr>
-        <p:grpSp>
-          <p:nvGrpSpPr>
-            <p:cNvPr id="12" name="Gruppieren 11">
-              <a:extLst>
-                <a:ext uri="{FF2B5EF4-FFF2-40B4-BE49-F238E27FC236}">
-                  <a16:creationId xmlns:a16="http://schemas.microsoft.com/office/drawing/2014/main" id="{0372D3BA-E3B8-47BA-9D7F-38137B1457EE}"/>
-                </a:ext>
-              </a:extLst>
-            </p:cNvPr>
-            <p:cNvGrpSpPr/>
-            <p:nvPr/>
-          </p:nvGrpSpPr>
-          <p:grpSpPr>
-            <a:xfrm>
-              <a:off x="6543010" y="8009948"/>
-              <a:ext cx="5232478" cy="11189858"/>
-              <a:chOff x="6543010" y="8009948"/>
-              <a:chExt cx="5232478" cy="11189858"/>
-            </a:xfrm>
-          </p:grpSpPr>
-          <p:pic>
-            <p:nvPicPr>
-              <p:cNvPr id="6" name="Grafik 5">
-                <a:extLst>
-                  <a:ext uri="{FF2B5EF4-FFF2-40B4-BE49-F238E27FC236}">
-                    <a16:creationId xmlns:a16="http://schemas.microsoft.com/office/drawing/2014/main" id="{43EE47C3-35CC-4BED-83B4-1003A6817F51}"/>
-                  </a:ext>
-                </a:extLst>
-              </p:cNvPr>
-              <p:cNvPicPr>
-                <a:picLocks noChangeAspect="1"/>
-              </p:cNvPicPr>
-              <p:nvPr/>
-            </p:nvPicPr>
-            <p:blipFill>
-              <a:blip r:embed="rId9">
-                <a:extLst>
-                  <a:ext uri="{28A0092B-C50C-407E-A947-70E740481C1C}">
-                    <a14:useLocalDpi xmlns:a14="http://schemas.microsoft.com/office/drawing/2010/main" val="0"/>
-                  </a:ext>
-                </a:extLst>
-              </a:blip>
-              <a:stretch>
-                <a:fillRect/>
-              </a:stretch>
-            </p:blipFill>
-            <p:spPr>
-              <a:xfrm>
-                <a:off x="6543010" y="8009948"/>
-                <a:ext cx="5232478" cy="11189858"/>
-              </a:xfrm>
-              <a:prstGeom prst="rect">
-                <a:avLst/>
-              </a:prstGeom>
-            </p:spPr>
-          </p:pic>
-          <p:pic>
-            <p:nvPicPr>
-              <p:cNvPr id="56" name="Grafik 55">
-                <a:extLst>
-                  <a:ext uri="{FF2B5EF4-FFF2-40B4-BE49-F238E27FC236}">
-                    <a16:creationId xmlns:a16="http://schemas.microsoft.com/office/drawing/2014/main" id="{623A8B7A-0F85-4732-A176-1FF3358C642D}"/>
-                  </a:ext>
-                </a:extLst>
-              </p:cNvPr>
-              <p:cNvPicPr>
-                <a:picLocks noChangeAspect="1"/>
-              </p:cNvPicPr>
-              <p:nvPr/>
-            </p:nvPicPr>
-            <p:blipFill rotWithShape="1">
-              <a:blip r:embed="rId9">
-                <a:extLst>
-                  <a:ext uri="{28A0092B-C50C-407E-A947-70E740481C1C}">
-                    <a14:useLocalDpi xmlns:a14="http://schemas.microsoft.com/office/drawing/2010/main" val="0"/>
-                  </a:ext>
-                </a:extLst>
-              </a:blip>
-              <a:srcRect l="62352" t="4288" r="33519" b="91207"/>
-              <a:stretch/>
-            </p:blipFill>
-            <p:spPr>
-              <a:xfrm>
-                <a:off x="6669928" y="8509292"/>
-                <a:ext cx="216024" cy="503997"/>
-              </a:xfrm>
-              <a:prstGeom prst="rect">
-                <a:avLst/>
-              </a:prstGeom>
-            </p:spPr>
-          </p:pic>
-        </p:grpSp>
-        <p:pic>
-          <p:nvPicPr>
-            <p:cNvPr id="25" name="Grafik 24">
-              <a:extLst>
-                <a:ext uri="{FF2B5EF4-FFF2-40B4-BE49-F238E27FC236}">
-                  <a16:creationId xmlns:a16="http://schemas.microsoft.com/office/drawing/2014/main" id="{8F3E22B2-10EA-44CC-A689-E880B7B13487}"/>
-                </a:ext>
-              </a:extLst>
-            </p:cNvPr>
-            <p:cNvPicPr>
-              <a:picLocks noChangeAspect="1"/>
-            </p:cNvPicPr>
-            <p:nvPr/>
-          </p:nvPicPr>
-          <p:blipFill>
-            <a:blip r:embed="rId10">
-              <a:extLst>
-                <a:ext uri="{28A0092B-C50C-407E-A947-70E740481C1C}">
-                  <a14:useLocalDpi xmlns:a14="http://schemas.microsoft.com/office/drawing/2010/main" val="0"/>
-                </a:ext>
-              </a:extLst>
-            </a:blip>
-            <a:stretch>
-              <a:fillRect/>
-            </a:stretch>
-          </p:blipFill>
-          <p:spPr>
-            <a:xfrm>
-              <a:off x="8443243" y="13907950"/>
-              <a:ext cx="544127" cy="241834"/>
-            </a:xfrm>
-            <a:prstGeom prst="rect">
-              <a:avLst/>
-            </a:prstGeom>
-          </p:spPr>
-        </p:pic>
-        <p:pic>
-          <p:nvPicPr>
-            <p:cNvPr id="60" name="Grafik 59">
-              <a:extLst>
-                <a:ext uri="{FF2B5EF4-FFF2-40B4-BE49-F238E27FC236}">
-                  <a16:creationId xmlns:a16="http://schemas.microsoft.com/office/drawing/2014/main" id="{36401960-F610-4458-AEB2-B847662A874B}"/>
-                </a:ext>
-              </a:extLst>
-            </p:cNvPr>
-            <p:cNvPicPr>
-              <a:picLocks noChangeAspect="1"/>
-            </p:cNvPicPr>
-            <p:nvPr/>
-          </p:nvPicPr>
-          <p:blipFill>
-            <a:blip r:embed="rId10">
-              <a:extLst>
-                <a:ext uri="{28A0092B-C50C-407E-A947-70E740481C1C}">
-                  <a14:useLocalDpi xmlns:a14="http://schemas.microsoft.com/office/drawing/2010/main" val="0"/>
-                </a:ext>
-              </a:extLst>
-            </a:blip>
-            <a:stretch>
-              <a:fillRect/>
-            </a:stretch>
-          </p:blipFill>
-          <p:spPr>
-            <a:xfrm>
-              <a:off x="7467068" y="15733960"/>
-              <a:ext cx="544127" cy="241834"/>
-            </a:xfrm>
-            <a:prstGeom prst="rect">
-              <a:avLst/>
-            </a:prstGeom>
-          </p:spPr>
-        </p:pic>
-        <p:pic>
-          <p:nvPicPr>
-            <p:cNvPr id="61" name="Grafik 60">
-              <a:extLst>
-                <a:ext uri="{FF2B5EF4-FFF2-40B4-BE49-F238E27FC236}">
-                  <a16:creationId xmlns:a16="http://schemas.microsoft.com/office/drawing/2014/main" id="{8517F534-0E87-489F-92BD-9C835D6EF584}"/>
-                </a:ext>
-              </a:extLst>
-            </p:cNvPr>
-            <p:cNvPicPr>
-              <a:picLocks noChangeAspect="1"/>
-            </p:cNvPicPr>
-            <p:nvPr/>
-          </p:nvPicPr>
-          <p:blipFill>
-            <a:blip r:embed="rId10">
-              <a:extLst>
-                <a:ext uri="{28A0092B-C50C-407E-A947-70E740481C1C}">
-                  <a14:useLocalDpi xmlns:a14="http://schemas.microsoft.com/office/drawing/2010/main" val="0"/>
-                </a:ext>
-              </a:extLst>
-            </a:blip>
-            <a:stretch>
-              <a:fillRect/>
-            </a:stretch>
-          </p:blipFill>
-          <p:spPr>
-            <a:xfrm>
-              <a:off x="10635420" y="15733960"/>
-              <a:ext cx="544127" cy="241834"/>
-            </a:xfrm>
-            <a:prstGeom prst="rect">
-              <a:avLst/>
-            </a:prstGeom>
-          </p:spPr>
-        </p:pic>
-        <p:pic>
-          <p:nvPicPr>
-            <p:cNvPr id="62" name="Grafik 61">
-              <a:extLst>
-                <a:ext uri="{FF2B5EF4-FFF2-40B4-BE49-F238E27FC236}">
-                  <a16:creationId xmlns:a16="http://schemas.microsoft.com/office/drawing/2014/main" id="{745485C8-C161-460C-809C-09B4A6D848D1}"/>
-                </a:ext>
-              </a:extLst>
-            </p:cNvPr>
-            <p:cNvPicPr>
-              <a:picLocks noChangeAspect="1"/>
-            </p:cNvPicPr>
-            <p:nvPr/>
-          </p:nvPicPr>
-          <p:blipFill>
-            <a:blip r:embed="rId10">
-              <a:extLst>
-                <a:ext uri="{28A0092B-C50C-407E-A947-70E740481C1C}">
-                  <a14:useLocalDpi xmlns:a14="http://schemas.microsoft.com/office/drawing/2010/main" val="0"/>
-                </a:ext>
-              </a:extLst>
-            </a:blip>
-            <a:stretch>
-              <a:fillRect/>
-            </a:stretch>
-          </p:blipFill>
-          <p:spPr>
-            <a:xfrm>
-              <a:off x="9734728" y="11316401"/>
-              <a:ext cx="432048" cy="192021"/>
-            </a:xfrm>
-            <a:prstGeom prst="rect">
-              <a:avLst/>
-            </a:prstGeom>
-          </p:spPr>
-        </p:pic>
-        <p:pic>
-          <p:nvPicPr>
-            <p:cNvPr id="63" name="Grafik 62">
-              <a:extLst>
-                <a:ext uri="{FF2B5EF4-FFF2-40B4-BE49-F238E27FC236}">
-                  <a16:creationId xmlns:a16="http://schemas.microsoft.com/office/drawing/2014/main" id="{FEBA9B94-6E60-4ED9-8EEC-9C389BEDC185}"/>
-                </a:ext>
-              </a:extLst>
-            </p:cNvPr>
-            <p:cNvPicPr>
-              <a:picLocks noChangeAspect="1"/>
-            </p:cNvPicPr>
-            <p:nvPr/>
-          </p:nvPicPr>
-          <p:blipFill>
-            <a:blip r:embed="rId10">
-              <a:extLst>
-                <a:ext uri="{28A0092B-C50C-407E-A947-70E740481C1C}">
-                  <a14:useLocalDpi xmlns:a14="http://schemas.microsoft.com/office/drawing/2010/main" val="0"/>
-                </a:ext>
-              </a:extLst>
-            </a:blip>
-            <a:stretch>
-              <a:fillRect/>
-            </a:stretch>
-          </p:blipFill>
-          <p:spPr>
-            <a:xfrm>
-              <a:off x="8251006" y="8625350"/>
-              <a:ext cx="221636" cy="130508"/>
-            </a:xfrm>
-            <a:prstGeom prst="rect">
-              <a:avLst/>
-            </a:prstGeom>
-          </p:spPr>
-        </p:pic>
-        <p:pic>
-          <p:nvPicPr>
-            <p:cNvPr id="64" name="Grafik 63">
-              <a:extLst>
-                <a:ext uri="{FF2B5EF4-FFF2-40B4-BE49-F238E27FC236}">
-                  <a16:creationId xmlns:a16="http://schemas.microsoft.com/office/drawing/2014/main" id="{EE6338A0-65B8-48BF-A9CD-591D6F4B9497}"/>
-                </a:ext>
-              </a:extLst>
-            </p:cNvPr>
-            <p:cNvPicPr>
-              <a:picLocks noChangeAspect="1"/>
-            </p:cNvPicPr>
-            <p:nvPr/>
-          </p:nvPicPr>
-          <p:blipFill>
-            <a:blip r:embed="rId10">
-              <a:extLst>
-                <a:ext uri="{28A0092B-C50C-407E-A947-70E740481C1C}">
-                  <a14:useLocalDpi xmlns:a14="http://schemas.microsoft.com/office/drawing/2010/main" val="0"/>
-                </a:ext>
-              </a:extLst>
-            </a:blip>
-            <a:stretch>
-              <a:fillRect/>
-            </a:stretch>
-          </p:blipFill>
-          <p:spPr>
-            <a:xfrm>
-              <a:off x="11415031" y="8603512"/>
-              <a:ext cx="216024" cy="130508"/>
-            </a:xfrm>
-            <a:prstGeom prst="rect">
-              <a:avLst/>
-            </a:prstGeom>
-          </p:spPr>
-        </p:pic>
-      </p:grpSp>
-      <p:pic>
-        <p:nvPicPr>
-          <p:cNvPr id="27" name="Grafik 26">
-            <a:extLst>
-              <a:ext uri="{FF2B5EF4-FFF2-40B4-BE49-F238E27FC236}">
-                <a16:creationId xmlns:a16="http://schemas.microsoft.com/office/drawing/2014/main" id="{65DAED6E-6B73-4115-99DF-2B6117D7DD58}"/>
+                <a16:creationId xmlns:a16="http://schemas.microsoft.com/office/drawing/2014/main" id="{2288CC2A-6D3E-42EE-AE1F-2053886C4BBB}"/>
               </a:ext>
             </a:extLst>
           </p:cNvPr>
@@ -6633,21 +5124,125 @@
           <p:nvPr/>
         </p:nvPicPr>
         <p:blipFill>
-          <a:blip r:embed="rId11">
+          <a:blip r:embed="rId4">
             <a:extLst>
               <a:ext uri="{28A0092B-C50C-407E-A947-70E740481C1C}">
                 <a14:useLocalDpi xmlns:a14="http://schemas.microsoft.com/office/drawing/2010/main" val="0"/>
               </a:ext>
             </a:extLst>
           </a:blip>
-          <a:stretch>
-            <a:fillRect/>
-          </a:stretch>
+          <a:srcRect/>
+          <a:stretch/>
         </p:blipFill>
         <p:spPr>
           <a:xfrm>
-            <a:off x="24879448" y="16584226"/>
-            <a:ext cx="4766012" cy="1022317"/>
+            <a:off x="6483134" y="8614351"/>
+            <a:ext cx="5219647" cy="10812125"/>
+          </a:xfrm>
+          <a:prstGeom prst="rect">
+            <a:avLst/>
+          </a:prstGeom>
+        </p:spPr>
+      </p:pic>
+      <p:pic>
+        <p:nvPicPr>
+          <p:cNvPr id="3" name="Grafik 2">
+            <a:extLst>
+              <a:ext uri="{FF2B5EF4-FFF2-40B4-BE49-F238E27FC236}">
+                <a16:creationId xmlns:a16="http://schemas.microsoft.com/office/drawing/2014/main" id="{A99EA248-4E4F-4E92-AA98-DC2E7CAD8FCB}"/>
+              </a:ext>
+            </a:extLst>
+          </p:cNvPr>
+          <p:cNvPicPr>
+            <a:picLocks noChangeAspect="1"/>
+          </p:cNvPicPr>
+          <p:nvPr/>
+        </p:nvPicPr>
+        <p:blipFill>
+          <a:blip r:embed="rId5">
+            <a:extLst>
+              <a:ext uri="{28A0092B-C50C-407E-A947-70E740481C1C}">
+                <a14:useLocalDpi xmlns:a14="http://schemas.microsoft.com/office/drawing/2010/main" val="0"/>
+              </a:ext>
+            </a:extLst>
+          </a:blip>
+          <a:srcRect/>
+          <a:stretch/>
+        </p:blipFill>
+        <p:spPr>
+          <a:xfrm>
+            <a:off x="12284626" y="8614350"/>
+            <a:ext cx="5470816" cy="8919808"/>
+          </a:xfrm>
+          <a:prstGeom prst="rect">
+            <a:avLst/>
+          </a:prstGeom>
+        </p:spPr>
+      </p:pic>
+      <p:pic>
+        <p:nvPicPr>
+          <p:cNvPr id="6" name="Grafik 5">
+            <a:extLst>
+              <a:ext uri="{FF2B5EF4-FFF2-40B4-BE49-F238E27FC236}">
+                <a16:creationId xmlns:a16="http://schemas.microsoft.com/office/drawing/2014/main" id="{0C925904-1B76-4603-95CD-AAE1B1D6222A}"/>
+              </a:ext>
+            </a:extLst>
+          </p:cNvPr>
+          <p:cNvPicPr>
+            <a:picLocks noChangeAspect="1"/>
+          </p:cNvPicPr>
+          <p:nvPr/>
+        </p:nvPicPr>
+        <p:blipFill>
+          <a:blip r:embed="rId6">
+            <a:extLst>
+              <a:ext uri="{28A0092B-C50C-407E-A947-70E740481C1C}">
+                <a14:useLocalDpi xmlns:a14="http://schemas.microsoft.com/office/drawing/2010/main" val="0"/>
+              </a:ext>
+            </a:extLst>
+          </a:blip>
+          <a:srcRect/>
+          <a:stretch/>
+        </p:blipFill>
+        <p:spPr>
+          <a:xfrm>
+            <a:off x="18460297" y="8614349"/>
+            <a:ext cx="5489112" cy="8919807"/>
+          </a:xfrm>
+          <a:prstGeom prst="rect">
+            <a:avLst/>
+          </a:prstGeom>
+        </p:spPr>
+      </p:pic>
+      <p:pic>
+        <p:nvPicPr>
+          <p:cNvPr id="11" name="Grafik 10">
+            <a:extLst>
+              <a:ext uri="{FF2B5EF4-FFF2-40B4-BE49-F238E27FC236}">
+                <a16:creationId xmlns:a16="http://schemas.microsoft.com/office/drawing/2014/main" id="{4F7F2107-285F-4ECF-AE20-E7897246AF3B}"/>
+              </a:ext>
+            </a:extLst>
+          </p:cNvPr>
+          <p:cNvPicPr>
+            <a:picLocks noChangeAspect="1"/>
+          </p:cNvPicPr>
+          <p:nvPr/>
+        </p:nvPicPr>
+        <p:blipFill>
+          <a:blip r:embed="rId7">
+            <a:extLst>
+              <a:ext uri="{28A0092B-C50C-407E-A947-70E740481C1C}">
+                <a14:useLocalDpi xmlns:a14="http://schemas.microsoft.com/office/drawing/2010/main" val="0"/>
+              </a:ext>
+            </a:extLst>
+          </a:blip>
+          <a:srcRect/>
+          <a:stretch/>
+        </p:blipFill>
+        <p:spPr>
+          <a:xfrm>
+            <a:off x="24510238" y="8604333"/>
+            <a:ext cx="5147815" cy="6471538"/>
           </a:xfrm>
           <a:prstGeom prst="rect">
             <a:avLst/>

</xml_diff>